<commit_message>
Fixes #155 Update ospsuite-R build badge Fixes #156 Update landscape picture Fixes #157 Update installation instructions
</commit_message>
<xml_diff>
--- a/OSP_software_landscape.pptx
+++ b/OSP_software_landscape.pptx
@@ -246,7 +246,7 @@
           <a:p>
             <a:fld id="{F32EF3B0-CF6E-47C7-B2C1-1DA818778E1A}" type="datetimeFigureOut">
               <a:rPr lang="en-US" smtClean="0"/>
-              <a:t>4/14/2023</a:t>
+              <a:t>9/26/2024</a:t>
             </a:fld>
             <a:endParaRPr lang="en-US"/>
           </a:p>
@@ -416,7 +416,7 @@
           <a:p>
             <a:fld id="{F32EF3B0-CF6E-47C7-B2C1-1DA818778E1A}" type="datetimeFigureOut">
               <a:rPr lang="en-US" smtClean="0"/>
-              <a:t>4/14/2023</a:t>
+              <a:t>9/26/2024</a:t>
             </a:fld>
             <a:endParaRPr lang="en-US"/>
           </a:p>
@@ -596,7 +596,7 @@
           <a:p>
             <a:fld id="{F32EF3B0-CF6E-47C7-B2C1-1DA818778E1A}" type="datetimeFigureOut">
               <a:rPr lang="en-US" smtClean="0"/>
-              <a:t>4/14/2023</a:t>
+              <a:t>9/26/2024</a:t>
             </a:fld>
             <a:endParaRPr lang="en-US"/>
           </a:p>
@@ -905,7 +905,7 @@
           <a:p>
             <a:fld id="{579268C1-3555-40F0-9F50-FDE1FC183A0D}" type="datetime1">
               <a:rPr lang="en-US" smtClean="0"/>
-              <a:t>4/14/2023</a:t>
+              <a:t>9/26/2024</a:t>
             </a:fld>
             <a:endParaRPr lang="en-US" dirty="0"/>
           </a:p>
@@ -1730,7 +1730,7 @@
           <a:p>
             <a:fld id="{9F33C267-8000-477D-991A-6C15839D7000}" type="datetime1">
               <a:rPr lang="en-US" smtClean="0"/>
-              <a:t>4/14/2023</a:t>
+              <a:t>9/26/2024</a:t>
             </a:fld>
             <a:endParaRPr lang="en-US" dirty="0"/>
           </a:p>
@@ -2765,7 +2765,7 @@
           <a:p>
             <a:fld id="{8CDB9F33-836B-4915-B13C-79B01E209756}" type="datetime1">
               <a:rPr lang="en-US" smtClean="0"/>
-              <a:t>4/14/2023</a:t>
+              <a:t>9/26/2024</a:t>
             </a:fld>
             <a:endParaRPr lang="en-US" dirty="0"/>
           </a:p>
@@ -3667,7 +3667,7 @@
           <a:p>
             <a:fld id="{48FAAE86-FF76-44CC-A668-018373AE554F}" type="datetime1">
               <a:rPr lang="en-US" smtClean="0"/>
-              <a:t>4/14/2023</a:t>
+              <a:t>9/26/2024</a:t>
             </a:fld>
             <a:endParaRPr lang="en-US" dirty="0"/>
           </a:p>
@@ -4192,7 +4192,7 @@
           <a:p>
             <a:fld id="{37D638D7-8796-4CCC-8CE6-AEAD9E04E798}" type="datetime1">
               <a:rPr lang="en-US" smtClean="0"/>
-              <a:t>4/14/2023</a:t>
+              <a:t>9/26/2024</a:t>
             </a:fld>
             <a:endParaRPr lang="en-US" dirty="0"/>
           </a:p>
@@ -5271,7 +5271,7 @@
           <a:p>
             <a:fld id="{DD080DD9-49B8-4603-936C-6A08F0541BA0}" type="datetime1">
               <a:rPr lang="en-US" smtClean="0"/>
-              <a:t>4/14/2023</a:t>
+              <a:t>9/26/2024</a:t>
             </a:fld>
             <a:endParaRPr lang="en-US" dirty="0"/>
           </a:p>
@@ -5914,7 +5914,7 @@
           <a:p>
             <a:fld id="{C67E0C7B-342B-4B60-BBFA-D89E1406DD42}" type="datetime1">
               <a:rPr lang="en-US" smtClean="0"/>
-              <a:t>4/14/2023</a:t>
+              <a:t>9/26/2024</a:t>
             </a:fld>
             <a:endParaRPr lang="en-US" dirty="0"/>
           </a:p>
@@ -6614,7 +6614,7 @@
           <a:p>
             <a:fld id="{1240F759-6C5A-4A96-885E-3AC3B4871ADC}" type="datetime1">
               <a:rPr lang="en-US" smtClean="0"/>
-              <a:t>4/14/2023</a:t>
+              <a:t>9/26/2024</a:t>
             </a:fld>
             <a:endParaRPr lang="en-US" dirty="0"/>
           </a:p>
@@ -6931,7 +6931,7 @@
           <a:p>
             <a:fld id="{F32EF3B0-CF6E-47C7-B2C1-1DA818778E1A}" type="datetimeFigureOut">
               <a:rPr lang="en-US" smtClean="0"/>
-              <a:t>4/14/2023</a:t>
+              <a:t>9/26/2024</a:t>
             </a:fld>
             <a:endParaRPr lang="en-US"/>
           </a:p>
@@ -7151,7 +7151,7 @@
           <a:p>
             <a:fld id="{5CC9A96C-B18F-4A61-9FE9-4BC0ED17C09C}" type="datetime1">
               <a:rPr lang="en-US" smtClean="0"/>
-              <a:t>4/14/2023</a:t>
+              <a:t>9/26/2024</a:t>
             </a:fld>
             <a:endParaRPr lang="en-US" dirty="0"/>
           </a:p>
@@ -7654,7 +7654,7 @@
           <a:p>
             <a:fld id="{64ACC3FA-741F-4DD7-A29C-E85845E74CE5}" type="datetime1">
               <a:rPr lang="en-US" smtClean="0"/>
-              <a:t>4/14/2023</a:t>
+              <a:t>9/26/2024</a:t>
             </a:fld>
             <a:endParaRPr lang="en-US" dirty="0"/>
           </a:p>
@@ -8241,7 +8241,7 @@
           <a:p>
             <a:fld id="{F09B50E6-EFC3-4D55-B5FD-6C07B3F1809C}" type="datetime1">
               <a:rPr lang="en-US" smtClean="0"/>
-              <a:t>4/14/2023</a:t>
+              <a:t>9/26/2024</a:t>
             </a:fld>
             <a:endParaRPr lang="en-US" dirty="0"/>
           </a:p>
@@ -8648,7 +8648,7 @@
           <a:p>
             <a:fld id="{7CF3B6FA-5BE5-423F-AE86-D3FCA9B0BA1B}" type="datetime1">
               <a:rPr lang="en-US" smtClean="0"/>
-              <a:t>4/14/2023</a:t>
+              <a:t>9/26/2024</a:t>
             </a:fld>
             <a:endParaRPr lang="en-US" dirty="0"/>
           </a:p>
@@ -8927,7 +8927,7 @@
           <a:p>
             <a:fld id="{54D65EF7-0DB8-46AD-91BA-1361F976A2E5}" type="datetime1">
               <a:rPr lang="en-US" smtClean="0"/>
-              <a:t>4/14/2023</a:t>
+              <a:t>9/26/2024</a:t>
             </a:fld>
             <a:endParaRPr lang="en-US" dirty="0"/>
           </a:p>
@@ -9381,7 +9381,7 @@
           <a:p>
             <a:fld id="{91DAC8AC-69B9-434F-A771-029EB0ECF11E}" type="datetime1">
               <a:rPr lang="en-US" smtClean="0"/>
-              <a:t>4/14/2023</a:t>
+              <a:t>9/26/2024</a:t>
             </a:fld>
             <a:endParaRPr lang="en-US" dirty="0"/>
           </a:p>
@@ -10366,7 +10366,7 @@
           <a:p>
             <a:fld id="{5576CC04-5BC7-4D90-881D-F4830D1A1CA8}" type="datetime1">
               <a:rPr lang="en-US" smtClean="0"/>
-              <a:t>4/14/2023</a:t>
+              <a:t>9/26/2024</a:t>
             </a:fld>
             <a:endParaRPr lang="en-US" dirty="0"/>
           </a:p>
@@ -11351,7 +11351,7 @@
           <a:p>
             <a:fld id="{42804E57-7BF7-4369-9EB4-F1EAB6B023F9}" type="datetime1">
               <a:rPr lang="en-US" smtClean="0"/>
-              <a:t>4/14/2023</a:t>
+              <a:t>9/26/2024</a:t>
             </a:fld>
             <a:endParaRPr lang="en-US" dirty="0"/>
           </a:p>
@@ -12236,7 +12236,7 @@
           <a:p>
             <a:fld id="{7819D966-6B5C-4844-BFB2-43E4A3473364}" type="datetime1">
               <a:rPr lang="en-US" smtClean="0"/>
-              <a:t>4/14/2023</a:t>
+              <a:t>9/26/2024</a:t>
             </a:fld>
             <a:endParaRPr lang="en-US" dirty="0"/>
           </a:p>
@@ -12921,7 +12921,7 @@
           <a:p>
             <a:fld id="{F0858C22-807B-43F5-8A6E-8319E9F1466D}" type="datetime1">
               <a:rPr lang="en-US" smtClean="0"/>
-              <a:t>4/14/2023</a:t>
+              <a:t>9/26/2024</a:t>
             </a:fld>
             <a:endParaRPr lang="en-US" dirty="0"/>
           </a:p>
@@ -13646,7 +13646,7 @@
           <a:p>
             <a:fld id="{F32EF3B0-CF6E-47C7-B2C1-1DA818778E1A}" type="datetimeFigureOut">
               <a:rPr lang="en-US" smtClean="0"/>
-              <a:t>4/14/2023</a:t>
+              <a:t>9/26/2024</a:t>
             </a:fld>
             <a:endParaRPr lang="en-US"/>
           </a:p>
@@ -13850,7 +13850,7 @@
           <a:p>
             <a:fld id="{57F28C20-F3BB-45EA-B82D-5FFBE4E3F507}" type="datetime1">
               <a:rPr lang="en-US" smtClean="0"/>
-              <a:t>4/14/2023</a:t>
+              <a:t>9/26/2024</a:t>
             </a:fld>
             <a:endParaRPr lang="en-US" dirty="0"/>
           </a:p>
@@ -14640,7 +14640,7 @@
           <a:p>
             <a:fld id="{579268C1-3555-40F0-9F50-FDE1FC183A0D}" type="datetime1">
               <a:rPr lang="en-US" smtClean="0"/>
-              <a:t>4/14/2023</a:t>
+              <a:t>9/26/2024</a:t>
             </a:fld>
             <a:endParaRPr lang="en-US" dirty="0"/>
           </a:p>
@@ -15745,7 +15745,7 @@
           <a:p>
             <a:fld id="{F32EF3B0-CF6E-47C7-B2C1-1DA818778E1A}" type="datetimeFigureOut">
               <a:rPr lang="en-US" smtClean="0"/>
-              <a:t>4/14/2023</a:t>
+              <a:t>9/26/2024</a:t>
             </a:fld>
             <a:endParaRPr lang="en-US"/>
           </a:p>
@@ -16112,7 +16112,7 @@
           <a:p>
             <a:fld id="{F32EF3B0-CF6E-47C7-B2C1-1DA818778E1A}" type="datetimeFigureOut">
               <a:rPr lang="en-US" smtClean="0"/>
-              <a:t>4/14/2023</a:t>
+              <a:t>9/26/2024</a:t>
             </a:fld>
             <a:endParaRPr lang="en-US"/>
           </a:p>
@@ -16230,7 +16230,7 @@
           <a:p>
             <a:fld id="{F32EF3B0-CF6E-47C7-B2C1-1DA818778E1A}" type="datetimeFigureOut">
               <a:rPr lang="en-US" smtClean="0"/>
-              <a:t>4/14/2023</a:t>
+              <a:t>9/26/2024</a:t>
             </a:fld>
             <a:endParaRPr lang="en-US"/>
           </a:p>
@@ -16325,7 +16325,7 @@
           <a:p>
             <a:fld id="{F32EF3B0-CF6E-47C7-B2C1-1DA818778E1A}" type="datetimeFigureOut">
               <a:rPr lang="en-US" smtClean="0"/>
-              <a:t>4/14/2023</a:t>
+              <a:t>9/26/2024</a:t>
             </a:fld>
             <a:endParaRPr lang="en-US"/>
           </a:p>
@@ -16602,7 +16602,7 @@
           <a:p>
             <a:fld id="{F32EF3B0-CF6E-47C7-B2C1-1DA818778E1A}" type="datetimeFigureOut">
               <a:rPr lang="en-US" smtClean="0"/>
-              <a:t>4/14/2023</a:t>
+              <a:t>9/26/2024</a:t>
             </a:fld>
             <a:endParaRPr lang="en-US"/>
           </a:p>
@@ -16859,7 +16859,7 @@
           <a:p>
             <a:fld id="{F32EF3B0-CF6E-47C7-B2C1-1DA818778E1A}" type="datetimeFigureOut">
               <a:rPr lang="en-US" smtClean="0"/>
-              <a:t>4/14/2023</a:t>
+              <a:t>9/26/2024</a:t>
             </a:fld>
             <a:endParaRPr lang="en-US"/>
           </a:p>
@@ -17072,7 +17072,7 @@
           <a:p>
             <a:fld id="{F32EF3B0-CF6E-47C7-B2C1-1DA818778E1A}" type="datetimeFigureOut">
               <a:rPr lang="en-US" smtClean="0"/>
-              <a:t>4/14/2023</a:t>
+              <a:t>9/26/2024</a:t>
             </a:fld>
             <a:endParaRPr lang="en-US"/>
           </a:p>
@@ -17719,7 +17719,7 @@
           <a:p>
             <a:fld id="{8E91F6B7-D9DD-40B9-8E0F-7B4E75E5DBFB}" type="datetime1">
               <a:rPr lang="en-US" smtClean="0"/>
-              <a:t>4/14/2023</a:t>
+              <a:t>9/26/2024</a:t>
             </a:fld>
             <a:endParaRPr lang="en-US" dirty="0"/>
           </a:p>
@@ -19707,14 +19707,14 @@
           <a:p>
             <a:pPr algn="ctr"/>
             <a:r>
-              <a:rPr lang="en-US" sz="2400" b="1">
+              <a:rPr lang="en-US" sz="2400" b="1" dirty="0">
                 <a:solidFill>
                   <a:srgbClr val="D30F4B"/>
                 </a:solidFill>
                 <a:latin typeface="Arial" panose="020B0604020202020204" pitchFamily="34" charset="0"/>
                 <a:cs typeface="Arial"/>
               </a:rPr>
-              <a:t>OSP Toolboxes / Interfaces </a:t>
+              <a:t>OSP Interfaces </a:t>
             </a:r>
           </a:p>
         </p:txBody>
@@ -20573,6 +20573,294 @@
           </a:prstGeom>
         </p:spPr>
       </p:pic>
+      <p:sp>
+        <p:nvSpPr>
+          <p:cNvPr id="2" name="Flussdiagramm: Dokument 1">
+            <a:extLst>
+              <a:ext uri="{FF2B5EF4-FFF2-40B4-BE49-F238E27FC236}">
+                <a16:creationId xmlns:a16="http://schemas.microsoft.com/office/drawing/2014/main" id="{57B5513F-2604-D243-895B-C9D2D2E4F959}"/>
+              </a:ext>
+            </a:extLst>
+          </p:cNvPr>
+          <p:cNvSpPr/>
+          <p:nvPr/>
+        </p:nvSpPr>
+        <p:spPr bwMode="gray">
+          <a:xfrm>
+            <a:off x="7430294" y="574966"/>
+            <a:ext cx="1447800" cy="1328907"/>
+          </a:xfrm>
+          <a:prstGeom prst="flowChartDocument">
+            <a:avLst/>
+          </a:prstGeom>
+          <a:noFill/>
+          <a:ln>
+            <a:solidFill>
+              <a:schemeClr val="accent1"/>
+            </a:solidFill>
+          </a:ln>
+        </p:spPr>
+        <p:style>
+          <a:lnRef idx="2">
+            <a:schemeClr val="accent1">
+              <a:shade val="50000"/>
+            </a:schemeClr>
+          </a:lnRef>
+          <a:fillRef idx="1">
+            <a:schemeClr val="accent1"/>
+          </a:fillRef>
+          <a:effectRef idx="0">
+            <a:schemeClr val="accent1"/>
+          </a:effectRef>
+          <a:fontRef idx="minor">
+            <a:schemeClr val="lt1"/>
+          </a:fontRef>
+        </p:style>
+        <p:txBody>
+          <a:bodyPr rtlCol="0" anchor="ctr"/>
+          <a:lstStyle/>
+          <a:p>
+            <a:pPr algn="ctr"/>
+            <a:endParaRPr lang="en-US" dirty="0">
+              <a:solidFill>
+                <a:srgbClr val="000000"/>
+              </a:solidFill>
+              <a:latin typeface="Arial" panose="020B0604020202020204" pitchFamily="34" charset="0"/>
+              <a:cs typeface="Arial"/>
+            </a:endParaRPr>
+          </a:p>
+          <a:p>
+            <a:pPr algn="ctr"/>
+            <a:r>
+              <a:rPr lang="en-US" dirty="0">
+                <a:solidFill>
+                  <a:srgbClr val="000000"/>
+                </a:solidFill>
+                <a:latin typeface="Arial" panose="020B0604020202020204" pitchFamily="34" charset="0"/>
+                <a:cs typeface="Arial"/>
+              </a:rPr>
+              <a:t>Project snapshots</a:t>
+            </a:r>
+          </a:p>
+          <a:p>
+            <a:pPr algn="ctr"/>
+            <a:r>
+              <a:rPr lang="en-US" dirty="0">
+                <a:solidFill>
+                  <a:srgbClr val="000000"/>
+                </a:solidFill>
+                <a:latin typeface="Arial" panose="020B0604020202020204" pitchFamily="34" charset="0"/>
+                <a:cs typeface="Arial"/>
+              </a:rPr>
+              <a:t>(</a:t>
+            </a:r>
+            <a:r>
+              <a:rPr lang="en-US" b="1" dirty="0">
+                <a:solidFill>
+                  <a:srgbClr val="000000"/>
+                </a:solidFill>
+                <a:latin typeface="Arial" panose="020B0604020202020204" pitchFamily="34" charset="0"/>
+                <a:cs typeface="Arial"/>
+              </a:rPr>
+              <a:t>JSON</a:t>
+            </a:r>
+            <a:r>
+              <a:rPr lang="en-US" dirty="0">
+                <a:solidFill>
+                  <a:srgbClr val="000000"/>
+                </a:solidFill>
+                <a:latin typeface="Arial" panose="020B0604020202020204" pitchFamily="34" charset="0"/>
+                <a:cs typeface="Arial"/>
+              </a:rPr>
+              <a:t>)</a:t>
+            </a:r>
+          </a:p>
+          <a:p>
+            <a:pPr algn="ctr"/>
+            <a:endParaRPr lang="en-US" dirty="0">
+              <a:solidFill>
+                <a:srgbClr val="000000"/>
+              </a:solidFill>
+              <a:latin typeface="Arial" panose="020B0604020202020204" pitchFamily="34" charset="0"/>
+              <a:cs typeface="Arial"/>
+            </a:endParaRPr>
+          </a:p>
+        </p:txBody>
+      </p:sp>
+      <p:sp>
+        <p:nvSpPr>
+          <p:cNvPr id="3" name="Gleichschenkliges Dreieck 2">
+            <a:extLst>
+              <a:ext uri="{FF2B5EF4-FFF2-40B4-BE49-F238E27FC236}">
+                <a16:creationId xmlns:a16="http://schemas.microsoft.com/office/drawing/2014/main" id="{EF40615B-C1ED-7C63-C9E6-92C80D897B77}"/>
+              </a:ext>
+            </a:extLst>
+          </p:cNvPr>
+          <p:cNvSpPr/>
+          <p:nvPr/>
+        </p:nvSpPr>
+        <p:spPr bwMode="gray">
+          <a:xfrm rot="5400000">
+            <a:off x="7040834" y="1187856"/>
+            <a:ext cx="457200" cy="188401"/>
+          </a:xfrm>
+          <a:prstGeom prst="triangle">
+            <a:avLst/>
+          </a:prstGeom>
+          <a:solidFill>
+            <a:srgbClr val="D30F4B"/>
+          </a:solidFill>
+          <a:ln>
+            <a:noFill/>
+          </a:ln>
+        </p:spPr>
+        <p:style>
+          <a:lnRef idx="2">
+            <a:schemeClr val="accent1">
+              <a:shade val="50000"/>
+            </a:schemeClr>
+          </a:lnRef>
+          <a:fillRef idx="1">
+            <a:schemeClr val="accent1"/>
+          </a:fillRef>
+          <a:effectRef idx="0">
+            <a:schemeClr val="accent1"/>
+          </a:effectRef>
+          <a:fontRef idx="minor">
+            <a:schemeClr val="lt1"/>
+          </a:fontRef>
+        </p:style>
+        <p:txBody>
+          <a:bodyPr rtlCol="0" anchor="ctr"/>
+          <a:lstStyle/>
+          <a:p>
+            <a:pPr algn="ctr"/>
+            <a:endParaRPr lang="en-US">
+              <a:solidFill>
+                <a:srgbClr val="D30F4B"/>
+              </a:solidFill>
+              <a:latin typeface="Arial" panose="020B0604020202020204" pitchFamily="34" charset="0"/>
+              <a:cs typeface="Arial"/>
+            </a:endParaRPr>
+          </a:p>
+        </p:txBody>
+      </p:sp>
+      <p:sp>
+        <p:nvSpPr>
+          <p:cNvPr id="4" name="Gleichschenkliges Dreieck 3">
+            <a:extLst>
+              <a:ext uri="{FF2B5EF4-FFF2-40B4-BE49-F238E27FC236}">
+                <a16:creationId xmlns:a16="http://schemas.microsoft.com/office/drawing/2014/main" id="{82950048-A2AE-04E0-3ACE-E057E9981E56}"/>
+              </a:ext>
+            </a:extLst>
+          </p:cNvPr>
+          <p:cNvSpPr/>
+          <p:nvPr/>
+        </p:nvSpPr>
+        <p:spPr bwMode="gray">
+          <a:xfrm rot="16200000">
+            <a:off x="6782663" y="1187852"/>
+            <a:ext cx="457200" cy="188401"/>
+          </a:xfrm>
+          <a:prstGeom prst="triangle">
+            <a:avLst/>
+          </a:prstGeom>
+          <a:solidFill>
+            <a:srgbClr val="D30F4B"/>
+          </a:solidFill>
+          <a:ln>
+            <a:noFill/>
+          </a:ln>
+        </p:spPr>
+        <p:style>
+          <a:lnRef idx="2">
+            <a:schemeClr val="accent1">
+              <a:shade val="50000"/>
+            </a:schemeClr>
+          </a:lnRef>
+          <a:fillRef idx="1">
+            <a:schemeClr val="accent1"/>
+          </a:fillRef>
+          <a:effectRef idx="0">
+            <a:schemeClr val="accent1"/>
+          </a:effectRef>
+          <a:fontRef idx="minor">
+            <a:schemeClr val="lt1"/>
+          </a:fontRef>
+        </p:style>
+        <p:txBody>
+          <a:bodyPr rtlCol="0" anchor="ctr"/>
+          <a:lstStyle/>
+          <a:p>
+            <a:pPr algn="ctr"/>
+            <a:endParaRPr lang="en-US">
+              <a:solidFill>
+                <a:srgbClr val="D30F4B"/>
+              </a:solidFill>
+              <a:latin typeface="Arial" panose="020B0604020202020204" pitchFamily="34" charset="0"/>
+              <a:cs typeface="Arial"/>
+            </a:endParaRPr>
+          </a:p>
+        </p:txBody>
+      </p:sp>
+      <p:sp>
+        <p:nvSpPr>
+          <p:cNvPr id="29" name="Gleichschenkliges Dreieck 28">
+            <a:extLst>
+              <a:ext uri="{FF2B5EF4-FFF2-40B4-BE49-F238E27FC236}">
+                <a16:creationId xmlns:a16="http://schemas.microsoft.com/office/drawing/2014/main" id="{641506FB-F74A-70E9-C35D-4A05BF2829F6}"/>
+              </a:ext>
+            </a:extLst>
+          </p:cNvPr>
+          <p:cNvSpPr/>
+          <p:nvPr/>
+        </p:nvSpPr>
+        <p:spPr bwMode="gray">
+          <a:xfrm rot="5400000">
+            <a:off x="8843489" y="1187853"/>
+            <a:ext cx="457200" cy="188401"/>
+          </a:xfrm>
+          <a:prstGeom prst="triangle">
+            <a:avLst/>
+          </a:prstGeom>
+          <a:solidFill>
+            <a:srgbClr val="D30F4B"/>
+          </a:solidFill>
+          <a:ln>
+            <a:noFill/>
+          </a:ln>
+        </p:spPr>
+        <p:style>
+          <a:lnRef idx="2">
+            <a:schemeClr val="accent1">
+              <a:shade val="50000"/>
+            </a:schemeClr>
+          </a:lnRef>
+          <a:fillRef idx="1">
+            <a:schemeClr val="accent1"/>
+          </a:fillRef>
+          <a:effectRef idx="0">
+            <a:schemeClr val="accent1"/>
+          </a:effectRef>
+          <a:fontRef idx="minor">
+            <a:schemeClr val="lt1"/>
+          </a:fontRef>
+        </p:style>
+        <p:txBody>
+          <a:bodyPr rtlCol="0" anchor="ctr"/>
+          <a:lstStyle/>
+          <a:p>
+            <a:pPr algn="ctr"/>
+            <a:endParaRPr lang="en-US">
+              <a:solidFill>
+                <a:srgbClr val="D30F4B"/>
+              </a:solidFill>
+              <a:latin typeface="Arial" panose="020B0604020202020204" pitchFamily="34" charset="0"/>
+              <a:cs typeface="Arial"/>
+            </a:endParaRPr>
+          </a:p>
+        </p:txBody>
+      </p:sp>
     </p:spTree>
     <p:extLst>
       <p:ext uri="{BB962C8B-B14F-4D97-AF65-F5344CB8AC3E}">

</xml_diff>